<commit_message>
update powerpoint sprint 2
</commit_message>
<xml_diff>
--- a/corporate-partners-appendix/modules/TAs/attachments/agile_reflection.pptx
+++ b/corporate-partners-appendix/modules/TAs/attachments/agile_reflection.pptx
@@ -5,7 +5,7 @@
     <p:sldMasterId id="2147483648" r:id="rId4"/>
   </p:sldMasterIdLst>
   <p:notesMasterIdLst>
-    <p:notesMasterId r:id="rId11"/>
+    <p:notesMasterId r:id="rId12"/>
   </p:notesMasterIdLst>
   <p:sldIdLst>
     <p:sldId id="257" r:id="rId5"/>
@@ -14,51 +14,52 @@
     <p:sldId id="352" r:id="rId8"/>
     <p:sldId id="353" r:id="rId9"/>
     <p:sldId id="355" r:id="rId10"/>
+    <p:sldId id="356" r:id="rId11"/>
   </p:sldIdLst>
   <p:sldSz cx="12192000" cy="6858000"/>
   <p:notesSz cx="6858000" cy="9144000"/>
   <p:embeddedFontLst>
     <p:embeddedFont>
-      <p:font typeface="Acumin Pro" panose="020F0502020204030204" pitchFamily="34" charset="0"/>
-      <p:regular r:id="rId12"/>
-      <p:bold r:id="rId13"/>
-      <p:italic r:id="rId14"/>
-      <p:boldItalic r:id="rId15"/>
+      <p:font typeface="Acumin Pro" panose="020B0504020202020204" pitchFamily="34" charset="77"/>
+      <p:regular r:id="rId13"/>
+      <p:bold r:id="rId14"/>
+      <p:italic r:id="rId15"/>
+      <p:boldItalic r:id="rId16"/>
     </p:embeddedFont>
     <p:embeddedFont>
-      <p:font typeface="Acumin Pro ExtraCondensed" panose="020F0502020204030204" pitchFamily="34" charset="0"/>
-      <p:regular r:id="rId16"/>
-      <p:bold r:id="rId17"/>
-      <p:italic r:id="rId18"/>
-      <p:boldItalic r:id="rId19"/>
+      <p:font typeface="Acumin Pro ExtraCondensed" panose="020B0508020202020204" pitchFamily="34" charset="77"/>
+      <p:regular r:id="rId17"/>
+      <p:bold r:id="rId18"/>
+      <p:italic r:id="rId19"/>
+      <p:boldItalic r:id="rId20"/>
     </p:embeddedFont>
     <p:embeddedFont>
       <p:font typeface="Acumin Pro SemiCondensed" panose="020F0502020204030204" pitchFamily="34" charset="0"/>
-      <p:regular r:id="rId20"/>
-      <p:bold r:id="rId21"/>
-      <p:italic r:id="rId22"/>
-      <p:boldItalic r:id="rId23"/>
+      <p:regular r:id="rId21"/>
+      <p:bold r:id="rId22"/>
+      <p:italic r:id="rId23"/>
+      <p:boldItalic r:id="rId24"/>
     </p:embeddedFont>
     <p:embeddedFont>
       <p:font typeface="Calibri" panose="020F0502020204030204" pitchFamily="34" charset="0"/>
-      <p:regular r:id="rId24"/>
-      <p:bold r:id="rId25"/>
-      <p:italic r:id="rId26"/>
-      <p:boldItalic r:id="rId27"/>
+      <p:regular r:id="rId25"/>
+      <p:bold r:id="rId26"/>
+      <p:italic r:id="rId27"/>
+      <p:boldItalic r:id="rId28"/>
     </p:embeddedFont>
     <p:embeddedFont>
       <p:font typeface="Franklin Gothic Book" panose="020B0503020102020204" pitchFamily="34" charset="0"/>
-      <p:regular r:id="rId28"/>
-      <p:italic r:id="rId29"/>
+      <p:regular r:id="rId29"/>
+      <p:italic r:id="rId30"/>
     </p:embeddedFont>
     <p:embeddedFont>
       <p:font typeface="Franklin Gothic Medium" panose="020B0603020102020204" pitchFamily="34" charset="0"/>
-      <p:regular r:id="rId30"/>
-      <p:italic r:id="rId31"/>
+      <p:regular r:id="rId31"/>
+      <p:italic r:id="rId32"/>
     </p:embeddedFont>
     <p:embeddedFont>
       <p:font typeface="Franklin Gothic Medium Cond" panose="020B0606030402020204" pitchFamily="34" charset="0"/>
-      <p:regular r:id="rId32"/>
+      <p:regular r:id="rId33"/>
     </p:embeddedFont>
   </p:embeddedFontLst>
   <p:defaultTextStyle>
@@ -271,7 +272,7 @@
           <a:p>
             <a:fld id="{01926CF7-48D8-2F46-AFC8-8A5D2298DFDD}" type="datetimeFigureOut">
               <a:rPr lang="en-US" smtClean="0"/>
-              <a:t>8/30/23</a:t>
+              <a:t>9/4/23</a:t>
             </a:fld>
             <a:endParaRPr lang="en-US"/>
           </a:p>
@@ -958,6 +959,90 @@
 </p:notes>
 </file>
 
+<file path=ppt/notesSlides/notesSlide6.xml><?xml version="1.0" encoding="utf-8"?>
+<p:notes xmlns:a="http://schemas.openxmlformats.org/drawingml/2006/main" xmlns:r="http://schemas.openxmlformats.org/officeDocument/2006/relationships" xmlns:p="http://schemas.openxmlformats.org/presentationml/2006/main">
+  <p:cSld>
+    <p:spTree>
+      <p:nvGrpSpPr>
+        <p:cNvPr id="1" name=""/>
+        <p:cNvGrpSpPr/>
+        <p:nvPr/>
+      </p:nvGrpSpPr>
+      <p:grpSpPr>
+        <a:xfrm>
+          <a:off x="0" y="0"/>
+          <a:ext cx="0" cy="0"/>
+          <a:chOff x="0" y="0"/>
+          <a:chExt cx="0" cy="0"/>
+        </a:xfrm>
+      </p:grpSpPr>
+      <p:sp>
+        <p:nvSpPr>
+          <p:cNvPr id="2" name="Slide Image Placeholder 1"/>
+          <p:cNvSpPr>
+            <a:spLocks noGrp="1" noRot="1" noChangeAspect="1"/>
+          </p:cNvSpPr>
+          <p:nvPr>
+            <p:ph type="sldImg"/>
+          </p:nvPr>
+        </p:nvSpPr>
+        <p:spPr/>
+      </p:sp>
+      <p:sp>
+        <p:nvSpPr>
+          <p:cNvPr id="3" name="Notes Placeholder 2"/>
+          <p:cNvSpPr>
+            <a:spLocks noGrp="1"/>
+          </p:cNvSpPr>
+          <p:nvPr>
+            <p:ph type="body" idx="1"/>
+          </p:nvPr>
+        </p:nvSpPr>
+        <p:spPr/>
+        <p:txBody>
+          <a:bodyPr/>
+          <a:lstStyle/>
+          <a:p>
+            <a:endParaRPr lang="en-US" dirty="0"/>
+          </a:p>
+        </p:txBody>
+      </p:sp>
+      <p:sp>
+        <p:nvSpPr>
+          <p:cNvPr id="4" name="Slide Number Placeholder 3"/>
+          <p:cNvSpPr>
+            <a:spLocks noGrp="1"/>
+          </p:cNvSpPr>
+          <p:nvPr>
+            <p:ph type="sldNum" sz="quarter" idx="5"/>
+          </p:nvPr>
+        </p:nvSpPr>
+        <p:spPr/>
+        <p:txBody>
+          <a:bodyPr/>
+          <a:lstStyle/>
+          <a:p>
+            <a:fld id="{237BF745-0557-B241-863F-056113C7032A}" type="slidenum">
+              <a:rPr lang="en-US" smtClean="0"/>
+              <a:t>7</a:t>
+            </a:fld>
+            <a:endParaRPr lang="en-US"/>
+          </a:p>
+        </p:txBody>
+      </p:sp>
+    </p:spTree>
+    <p:extLst>
+      <p:ext uri="{BB962C8B-B14F-4D97-AF65-F5344CB8AC3E}">
+        <p14:creationId xmlns:p14="http://schemas.microsoft.com/office/powerpoint/2010/main" val="283498475"/>
+      </p:ext>
+    </p:extLst>
+  </p:cSld>
+  <p:clrMapOvr>
+    <a:masterClrMapping/>
+  </p:clrMapOvr>
+</p:notes>
+</file>
+
 <file path=ppt/slideLayouts/slideLayout1.xml><?xml version="1.0" encoding="utf-8"?>
 <p:sldLayout xmlns:a="http://schemas.openxmlformats.org/drawingml/2006/main" xmlns:r="http://schemas.openxmlformats.org/officeDocument/2006/relationships" xmlns:p="http://schemas.openxmlformats.org/presentationml/2006/main" preserve="1" userDrawn="1">
   <p:cSld name="Title Slide - Black">
@@ -13210,7 +13295,7 @@
             <a:fld id="{D47A9A36-4EB0-BF46-AE48-7CDA251B954B}" type="datetime1">
               <a:rPr lang="en-US" smtClean="0"/>
               <a:pPr/>
-              <a:t>8/30/23</a:t>
+              <a:t>9/4/23</a:t>
             </a:fld>
             <a:endParaRPr lang="en-US"/>
           </a:p>
@@ -16604,7 +16689,7 @@
             <a:fld id="{E0C8DACD-4E35-4E4C-AC75-C3DE50F04E7E}" type="datetime1">
               <a:rPr lang="en-US" smtClean="0"/>
               <a:pPr/>
-              <a:t>8/30/23</a:t>
+              <a:t>9/4/23</a:t>
             </a:fld>
             <a:endParaRPr lang="en-US"/>
           </a:p>
@@ -16953,7 +17038,7 @@
             <a:fld id="{E0C8DACD-4E35-4E4C-AC75-C3DE50F04E7E}" type="datetime1">
               <a:rPr lang="en-US" smtClean="0"/>
               <a:pPr/>
-              <a:t>8/30/23</a:t>
+              <a:t>9/4/23</a:t>
             </a:fld>
             <a:endParaRPr lang="en-US"/>
           </a:p>
@@ -17217,7 +17302,7 @@
                   <a:schemeClr val="bg1"/>
                 </a:solidFill>
               </a:rPr>
-              <a:t>What went less during Sprint #1? (Lego Activity, Mentor/Lab Meeting)</a:t>
+              <a:t>What didn’t go well during Sprint #1? (Lego Activity, Mentor/Lab Meeting)</a:t>
             </a:r>
           </a:p>
           <a:p>
@@ -17371,7 +17456,7 @@
                   <a:srgbClr val="EBD99F"/>
                 </a:solidFill>
               </a:rPr>
-              <a:t>Daily Stand-up (5-10 minutes)</a:t>
+              <a:t>Stand-up (5-10 minutes)</a:t>
             </a:r>
           </a:p>
         </p:txBody>
@@ -17534,7 +17619,7 @@
             <a:fld id="{E0C8DACD-4E35-4E4C-AC75-C3DE50F04E7E}" type="datetime1">
               <a:rPr lang="en-US" smtClean="0"/>
               <a:pPr/>
-              <a:t>8/30/23</a:t>
+              <a:t>9/4/23</a:t>
             </a:fld>
             <a:endParaRPr lang="en-US"/>
           </a:p>
@@ -18097,7 +18182,7 @@
             <a:fld id="{E0C8DACD-4E35-4E4C-AC75-C3DE50F04E7E}" type="datetime1">
               <a:rPr lang="en-US" smtClean="0"/>
               <a:pPr/>
-              <a:t>8/30/23</a:t>
+              <a:t>9/4/23</a:t>
             </a:fld>
             <a:endParaRPr lang="en-US"/>
           </a:p>
@@ -18667,7 +18752,7 @@
             <a:fld id="{E0C8DACD-4E35-4E4C-AC75-C3DE50F04E7E}" type="datetime1">
               <a:rPr lang="en-US" smtClean="0"/>
               <a:pPr/>
-              <a:t>8/30/23</a:t>
+              <a:t>9/4/23</a:t>
             </a:fld>
             <a:endParaRPr lang="en-US"/>
           </a:p>
@@ -18781,6 +18866,402 @@
     <p:extLst>
       <p:ext uri="{BB962C8B-B14F-4D97-AF65-F5344CB8AC3E}">
         <p14:creationId xmlns:p14="http://schemas.microsoft.com/office/powerpoint/2010/main" val="2109556261"/>
+      </p:ext>
+    </p:extLst>
+  </p:cSld>
+  <p:clrMapOvr>
+    <a:masterClrMapping/>
+  </p:clrMapOvr>
+</p:sld>
+</file>
+
+<file path=ppt/slides/slide7.xml><?xml version="1.0" encoding="utf-8"?>
+<p:sld xmlns:a="http://schemas.openxmlformats.org/drawingml/2006/main" xmlns:r="http://schemas.openxmlformats.org/officeDocument/2006/relationships" xmlns:p="http://schemas.openxmlformats.org/presentationml/2006/main">
+  <p:cSld>
+    <p:spTree>
+      <p:nvGrpSpPr>
+        <p:cNvPr id="1" name=""/>
+        <p:cNvGrpSpPr/>
+        <p:nvPr/>
+      </p:nvGrpSpPr>
+      <p:grpSpPr>
+        <a:xfrm>
+          <a:off x="0" y="0"/>
+          <a:ext cx="0" cy="0"/>
+          <a:chOff x="0" y="0"/>
+          <a:chExt cx="0" cy="0"/>
+        </a:xfrm>
+      </p:grpSpPr>
+      <p:sp>
+        <p:nvSpPr>
+          <p:cNvPr id="6" name="Title 5">
+            <a:extLst>
+              <a:ext uri="{FF2B5EF4-FFF2-40B4-BE49-F238E27FC236}">
+                <a16:creationId xmlns:a16="http://schemas.microsoft.com/office/drawing/2014/main" id="{D08AB06A-6B63-9A84-6282-A333F77AFEA1}"/>
+              </a:ext>
+            </a:extLst>
+          </p:cNvPr>
+          <p:cNvSpPr>
+            <a:spLocks noGrp="1"/>
+          </p:cNvSpPr>
+          <p:nvPr>
+            <p:ph type="ctrTitle"/>
+          </p:nvPr>
+        </p:nvSpPr>
+        <p:spPr>
+          <a:xfrm>
+            <a:off x="2101510" y="370921"/>
+            <a:ext cx="7988980" cy="626325"/>
+          </a:xfrm>
+        </p:spPr>
+        <p:txBody>
+          <a:bodyPr/>
+          <a:lstStyle/>
+          <a:p>
+            <a:r>
+              <a:rPr lang="en-US" sz="4400" dirty="0">
+                <a:solidFill>
+                  <a:srgbClr val="EBD99F"/>
+                </a:solidFill>
+              </a:rPr>
+              <a:t>Starter Guide &amp; Literature Review</a:t>
+            </a:r>
+          </a:p>
+        </p:txBody>
+      </p:sp>
+      <p:sp>
+        <p:nvSpPr>
+          <p:cNvPr id="5" name="Slide Number Placeholder 4">
+            <a:extLst>
+              <a:ext uri="{FF2B5EF4-FFF2-40B4-BE49-F238E27FC236}">
+                <a16:creationId xmlns:a16="http://schemas.microsoft.com/office/drawing/2014/main" id="{079CDBEF-9D1D-DDB1-C4C8-A9817DA62F9A}"/>
+              </a:ext>
+            </a:extLst>
+          </p:cNvPr>
+          <p:cNvSpPr>
+            <a:spLocks noGrp="1"/>
+          </p:cNvSpPr>
+          <p:nvPr>
+            <p:ph type="sldNum" sz="quarter" idx="12"/>
+          </p:nvPr>
+        </p:nvSpPr>
+        <p:spPr/>
+        <p:txBody>
+          <a:bodyPr/>
+          <a:lstStyle/>
+          <a:p>
+            <a:fld id="{8A7A6979-0714-4377-B894-6BE4C2D6E202}" type="slidenum">
+              <a:rPr lang="en-US" smtClean="0"/>
+              <a:pPr/>
+              <a:t>7</a:t>
+            </a:fld>
+            <a:endParaRPr lang="en-US"/>
+          </a:p>
+        </p:txBody>
+      </p:sp>
+      <p:sp>
+        <p:nvSpPr>
+          <p:cNvPr id="4" name="Date Placeholder 3">
+            <a:extLst>
+              <a:ext uri="{FF2B5EF4-FFF2-40B4-BE49-F238E27FC236}">
+                <a16:creationId xmlns:a16="http://schemas.microsoft.com/office/drawing/2014/main" id="{4CDE6F09-9B10-5238-7123-0B118E57F72B}"/>
+              </a:ext>
+            </a:extLst>
+          </p:cNvPr>
+          <p:cNvSpPr>
+            <a:spLocks noGrp="1"/>
+          </p:cNvSpPr>
+          <p:nvPr>
+            <p:ph type="dt" sz="half" idx="4294967295"/>
+          </p:nvPr>
+        </p:nvSpPr>
+        <p:spPr>
+          <a:xfrm>
+            <a:off x="8744769" y="6227670"/>
+            <a:ext cx="1161231" cy="323968"/>
+          </a:xfrm>
+          <a:prstGeom prst="rect">
+            <a:avLst/>
+          </a:prstGeom>
+        </p:spPr>
+        <p:txBody>
+          <a:bodyPr vert="horz" lIns="91440" tIns="45720" rIns="91440" bIns="45720" rtlCol="0" anchor="ctr"/>
+          <a:lstStyle>
+            <a:defPPr>
+              <a:defRPr lang="en-US"/>
+            </a:defPPr>
+            <a:lvl1pPr marL="0" algn="r" defTabSz="457200" rtl="0" eaLnBrk="1" latinLnBrk="0" hangingPunct="1">
+              <a:defRPr sz="1000" b="0" i="0" kern="1200">
+                <a:solidFill>
+                  <a:schemeClr val="tx1">
+                    <a:alpha val="70000"/>
+                  </a:schemeClr>
+                </a:solidFill>
+                <a:latin typeface="Acumin Pro" panose="020B0504020202020204" pitchFamily="34" charset="77"/>
+                <a:ea typeface="+mn-ea"/>
+                <a:cs typeface="+mn-cs"/>
+              </a:defRPr>
+            </a:lvl1pPr>
+            <a:lvl2pPr marL="457200" algn="l" defTabSz="457200" rtl="0" eaLnBrk="1" latinLnBrk="0" hangingPunct="1">
+              <a:defRPr sz="1800" kern="1200">
+                <a:solidFill>
+                  <a:schemeClr val="tx1"/>
+                </a:solidFill>
+                <a:latin typeface="+mn-lt"/>
+                <a:ea typeface="+mn-ea"/>
+                <a:cs typeface="+mn-cs"/>
+              </a:defRPr>
+            </a:lvl2pPr>
+            <a:lvl3pPr marL="914400" algn="l" defTabSz="457200" rtl="0" eaLnBrk="1" latinLnBrk="0" hangingPunct="1">
+              <a:defRPr sz="1800" kern="1200">
+                <a:solidFill>
+                  <a:schemeClr val="tx1"/>
+                </a:solidFill>
+                <a:latin typeface="+mn-lt"/>
+                <a:ea typeface="+mn-ea"/>
+                <a:cs typeface="+mn-cs"/>
+              </a:defRPr>
+            </a:lvl3pPr>
+            <a:lvl4pPr marL="1371600" algn="l" defTabSz="457200" rtl="0" eaLnBrk="1" latinLnBrk="0" hangingPunct="1">
+              <a:defRPr sz="1800" kern="1200">
+                <a:solidFill>
+                  <a:schemeClr val="tx1"/>
+                </a:solidFill>
+                <a:latin typeface="+mn-lt"/>
+                <a:ea typeface="+mn-ea"/>
+                <a:cs typeface="+mn-cs"/>
+              </a:defRPr>
+            </a:lvl4pPr>
+            <a:lvl5pPr marL="1828800" algn="l" defTabSz="457200" rtl="0" eaLnBrk="1" latinLnBrk="0" hangingPunct="1">
+              <a:defRPr sz="1800" kern="1200">
+                <a:solidFill>
+                  <a:schemeClr val="tx1"/>
+                </a:solidFill>
+                <a:latin typeface="+mn-lt"/>
+                <a:ea typeface="+mn-ea"/>
+                <a:cs typeface="+mn-cs"/>
+              </a:defRPr>
+            </a:lvl5pPr>
+            <a:lvl6pPr marL="2286000" algn="l" defTabSz="457200" rtl="0" eaLnBrk="1" latinLnBrk="0" hangingPunct="1">
+              <a:defRPr sz="1800" kern="1200">
+                <a:solidFill>
+                  <a:schemeClr val="tx1"/>
+                </a:solidFill>
+                <a:latin typeface="+mn-lt"/>
+                <a:ea typeface="+mn-ea"/>
+                <a:cs typeface="+mn-cs"/>
+              </a:defRPr>
+            </a:lvl6pPr>
+            <a:lvl7pPr marL="2743200" algn="l" defTabSz="457200" rtl="0" eaLnBrk="1" latinLnBrk="0" hangingPunct="1">
+              <a:defRPr sz="1800" kern="1200">
+                <a:solidFill>
+                  <a:schemeClr val="tx1"/>
+                </a:solidFill>
+                <a:latin typeface="+mn-lt"/>
+                <a:ea typeface="+mn-ea"/>
+                <a:cs typeface="+mn-cs"/>
+              </a:defRPr>
+            </a:lvl7pPr>
+            <a:lvl8pPr marL="3200400" algn="l" defTabSz="457200" rtl="0" eaLnBrk="1" latinLnBrk="0" hangingPunct="1">
+              <a:defRPr sz="1800" kern="1200">
+                <a:solidFill>
+                  <a:schemeClr val="tx1"/>
+                </a:solidFill>
+                <a:latin typeface="+mn-lt"/>
+                <a:ea typeface="+mn-ea"/>
+                <a:cs typeface="+mn-cs"/>
+              </a:defRPr>
+            </a:lvl8pPr>
+            <a:lvl9pPr marL="3657600" algn="l" defTabSz="457200" rtl="0" eaLnBrk="1" latinLnBrk="0" hangingPunct="1">
+              <a:defRPr sz="1800" kern="1200">
+                <a:solidFill>
+                  <a:schemeClr val="tx1"/>
+                </a:solidFill>
+                <a:latin typeface="+mn-lt"/>
+                <a:ea typeface="+mn-ea"/>
+                <a:cs typeface="+mn-cs"/>
+              </a:defRPr>
+            </a:lvl9pPr>
+          </a:lstStyle>
+          <a:p>
+            <a:fld id="{E0C8DACD-4E35-4E4C-AC75-C3DE50F04E7E}" type="datetime1">
+              <a:rPr lang="en-US" smtClean="0"/>
+              <a:pPr/>
+              <a:t>9/4/23</a:t>
+            </a:fld>
+            <a:endParaRPr lang="en-US"/>
+          </a:p>
+        </p:txBody>
+      </p:sp>
+      <p:sp>
+        <p:nvSpPr>
+          <p:cNvPr id="9" name="TextBox 8">
+            <a:extLst>
+              <a:ext uri="{FF2B5EF4-FFF2-40B4-BE49-F238E27FC236}">
+                <a16:creationId xmlns:a16="http://schemas.microsoft.com/office/drawing/2014/main" id="{F8678FA1-F450-79FC-F095-B4F244524A43}"/>
+              </a:ext>
+            </a:extLst>
+          </p:cNvPr>
+          <p:cNvSpPr txBox="1"/>
+          <p:nvPr/>
+        </p:nvSpPr>
+        <p:spPr>
+          <a:xfrm>
+            <a:off x="1366772" y="5580669"/>
+            <a:ext cx="10466172" cy="646331"/>
+          </a:xfrm>
+          <a:prstGeom prst="rect">
+            <a:avLst/>
+          </a:prstGeom>
+          <a:noFill/>
+        </p:spPr>
+        <p:txBody>
+          <a:bodyPr wrap="square">
+            <a:spAutoFit/>
+          </a:bodyPr>
+          <a:lstStyle/>
+          <a:p>
+            <a:r>
+              <a:rPr lang="en-US" b="1" u="sng" dirty="0">
+                <a:solidFill>
+                  <a:schemeClr val="bg1"/>
+                </a:solidFill>
+                <a:hlinkClick r:id="rId3"/>
+              </a:rPr>
+              <a:t>Starter guides: </a:t>
+            </a:r>
+            <a:r>
+              <a:rPr lang="en-US" b="1" u="sng" dirty="0">
+                <a:solidFill>
+                  <a:schemeClr val="bg1"/>
+                </a:solidFill>
+              </a:rPr>
+              <a:t> </a:t>
+            </a:r>
+            <a:r>
+              <a:rPr lang="en-US" b="1" u="sng" dirty="0">
+                <a:solidFill>
+                  <a:schemeClr val="bg1"/>
+                </a:solidFill>
+                <a:hlinkClick r:id="rId4"/>
+              </a:rPr>
+              <a:t>https://the-examples-book.com/starter-guides/introduction</a:t>
+            </a:r>
+            <a:endParaRPr lang="en-US" b="1" u="sng" dirty="0">
+              <a:solidFill>
+                <a:schemeClr val="bg1"/>
+              </a:solidFill>
+            </a:endParaRPr>
+          </a:p>
+          <a:p>
+            <a:r>
+              <a:rPr lang="en-US" b="1" u="sng" dirty="0">
+                <a:solidFill>
+                  <a:schemeClr val="bg1"/>
+                </a:solidFill>
+              </a:rPr>
+              <a:t>Purdue literature review guide: https://</a:t>
+            </a:r>
+            <a:r>
+              <a:rPr lang="en-US" b="1" u="sng" dirty="0" err="1">
+                <a:solidFill>
+                  <a:schemeClr val="bg1"/>
+                </a:solidFill>
+              </a:rPr>
+              <a:t>guides.lib.purdue.edu</a:t>
+            </a:r>
+            <a:r>
+              <a:rPr lang="en-US" b="1" u="sng" dirty="0">
+                <a:solidFill>
+                  <a:schemeClr val="bg1"/>
+                </a:solidFill>
+              </a:rPr>
+              <a:t>/</a:t>
+            </a:r>
+            <a:r>
+              <a:rPr lang="en-US" b="1" u="sng" dirty="0" err="1">
+                <a:solidFill>
+                  <a:schemeClr val="bg1"/>
+                </a:solidFill>
+              </a:rPr>
+              <a:t>research_approaches</a:t>
+            </a:r>
+            <a:r>
+              <a:rPr lang="en-US" b="1" u="sng" dirty="0">
+                <a:solidFill>
+                  <a:schemeClr val="bg1"/>
+                </a:solidFill>
+              </a:rPr>
+              <a:t>/</a:t>
+            </a:r>
+            <a:r>
+              <a:rPr lang="en-US" b="1" u="sng" dirty="0" err="1">
+                <a:solidFill>
+                  <a:schemeClr val="bg1"/>
+                </a:solidFill>
+              </a:rPr>
+              <a:t>litreview</a:t>
+            </a:r>
+            <a:endParaRPr lang="en-US" b="1" u="sng" dirty="0">
+              <a:solidFill>
+                <a:schemeClr val="bg1"/>
+              </a:solidFill>
+            </a:endParaRPr>
+          </a:p>
+        </p:txBody>
+      </p:sp>
+      <p:pic>
+        <p:nvPicPr>
+          <p:cNvPr id="1026" name="Picture 2" descr="12,600+ Literature Review Stock Photos, Pictures &amp; Royalty-Free Images -  iStock | Literature review icon">
+            <a:hlinkClick r:id="rId5"/>
+            <a:extLst>
+              <a:ext uri="{FF2B5EF4-FFF2-40B4-BE49-F238E27FC236}">
+                <a16:creationId xmlns:a16="http://schemas.microsoft.com/office/drawing/2014/main" id="{E31AAAD4-16CD-F88D-7145-0968C1730AEB}"/>
+              </a:ext>
+            </a:extLst>
+          </p:cNvPr>
+          <p:cNvPicPr>
+            <a:picLocks noChangeAspect="1" noChangeArrowheads="1"/>
+          </p:cNvPicPr>
+          <p:nvPr/>
+        </p:nvPicPr>
+        <p:blipFill>
+          <a:blip r:embed="rId6">
+            <a:extLst>
+              <a:ext uri="{28A0092B-C50C-407E-A947-70E740481C1C}">
+                <a14:useLocalDpi xmlns:a14="http://schemas.microsoft.com/office/drawing/2010/main" val="0"/>
+              </a:ext>
+            </a:extLst>
+          </a:blip>
+          <a:srcRect/>
+          <a:stretch>
+            <a:fillRect/>
+          </a:stretch>
+        </p:blipFill>
+        <p:spPr bwMode="auto">
+          <a:xfrm>
+            <a:off x="3528189" y="1311754"/>
+            <a:ext cx="5888313" cy="3954406"/>
+          </a:xfrm>
+          <a:prstGeom prst="rect">
+            <a:avLst/>
+          </a:prstGeom>
+          <a:noFill/>
+          <a:extLst>
+            <a:ext uri="{909E8E84-426E-40DD-AFC4-6F175D3DCCD1}">
+              <a14:hiddenFill xmlns:a14="http://schemas.microsoft.com/office/drawing/2010/main">
+                <a:solidFill>
+                  <a:srgbClr val="FFFFFF"/>
+                </a:solidFill>
+              </a14:hiddenFill>
+            </a:ext>
+          </a:extLst>
+        </p:spPr>
+      </p:pic>
+    </p:spTree>
+    <p:extLst>
+      <p:ext uri="{BB962C8B-B14F-4D97-AF65-F5344CB8AC3E}">
+        <p14:creationId xmlns:p14="http://schemas.microsoft.com/office/powerpoint/2010/main" val="4040738487"/>
       </p:ext>
     </p:extLst>
   </p:cSld>

</xml_diff>

<commit_message>
Update professional attire (#863)
* Update professional_attire_guide.adoc

* Update professional_attire_guide.adoc

* update powerpoint sprint 2
</commit_message>
<xml_diff>
--- a/corporate-partners-appendix/modules/TAs/attachments/agile_reflection.pptx
+++ b/corporate-partners-appendix/modules/TAs/attachments/agile_reflection.pptx
@@ -5,7 +5,7 @@
     <p:sldMasterId id="2147483648" r:id="rId4"/>
   </p:sldMasterIdLst>
   <p:notesMasterIdLst>
-    <p:notesMasterId r:id="rId11"/>
+    <p:notesMasterId r:id="rId12"/>
   </p:notesMasterIdLst>
   <p:sldIdLst>
     <p:sldId id="257" r:id="rId5"/>
@@ -14,51 +14,52 @@
     <p:sldId id="352" r:id="rId8"/>
     <p:sldId id="353" r:id="rId9"/>
     <p:sldId id="355" r:id="rId10"/>
+    <p:sldId id="356" r:id="rId11"/>
   </p:sldIdLst>
   <p:sldSz cx="12192000" cy="6858000"/>
   <p:notesSz cx="6858000" cy="9144000"/>
   <p:embeddedFontLst>
     <p:embeddedFont>
-      <p:font typeface="Acumin Pro" panose="020F0502020204030204" pitchFamily="34" charset="0"/>
-      <p:regular r:id="rId12"/>
-      <p:bold r:id="rId13"/>
-      <p:italic r:id="rId14"/>
-      <p:boldItalic r:id="rId15"/>
+      <p:font typeface="Acumin Pro" panose="020B0504020202020204" pitchFamily="34" charset="77"/>
+      <p:regular r:id="rId13"/>
+      <p:bold r:id="rId14"/>
+      <p:italic r:id="rId15"/>
+      <p:boldItalic r:id="rId16"/>
     </p:embeddedFont>
     <p:embeddedFont>
-      <p:font typeface="Acumin Pro ExtraCondensed" panose="020F0502020204030204" pitchFamily="34" charset="0"/>
-      <p:regular r:id="rId16"/>
-      <p:bold r:id="rId17"/>
-      <p:italic r:id="rId18"/>
-      <p:boldItalic r:id="rId19"/>
+      <p:font typeface="Acumin Pro ExtraCondensed" panose="020B0508020202020204" pitchFamily="34" charset="77"/>
+      <p:regular r:id="rId17"/>
+      <p:bold r:id="rId18"/>
+      <p:italic r:id="rId19"/>
+      <p:boldItalic r:id="rId20"/>
     </p:embeddedFont>
     <p:embeddedFont>
       <p:font typeface="Acumin Pro SemiCondensed" panose="020F0502020204030204" pitchFamily="34" charset="0"/>
-      <p:regular r:id="rId20"/>
-      <p:bold r:id="rId21"/>
-      <p:italic r:id="rId22"/>
-      <p:boldItalic r:id="rId23"/>
+      <p:regular r:id="rId21"/>
+      <p:bold r:id="rId22"/>
+      <p:italic r:id="rId23"/>
+      <p:boldItalic r:id="rId24"/>
     </p:embeddedFont>
     <p:embeddedFont>
       <p:font typeface="Calibri" panose="020F0502020204030204" pitchFamily="34" charset="0"/>
-      <p:regular r:id="rId24"/>
-      <p:bold r:id="rId25"/>
-      <p:italic r:id="rId26"/>
-      <p:boldItalic r:id="rId27"/>
+      <p:regular r:id="rId25"/>
+      <p:bold r:id="rId26"/>
+      <p:italic r:id="rId27"/>
+      <p:boldItalic r:id="rId28"/>
     </p:embeddedFont>
     <p:embeddedFont>
       <p:font typeface="Franklin Gothic Book" panose="020B0503020102020204" pitchFamily="34" charset="0"/>
-      <p:regular r:id="rId28"/>
-      <p:italic r:id="rId29"/>
+      <p:regular r:id="rId29"/>
+      <p:italic r:id="rId30"/>
     </p:embeddedFont>
     <p:embeddedFont>
       <p:font typeface="Franklin Gothic Medium" panose="020B0603020102020204" pitchFamily="34" charset="0"/>
-      <p:regular r:id="rId30"/>
-      <p:italic r:id="rId31"/>
+      <p:regular r:id="rId31"/>
+      <p:italic r:id="rId32"/>
     </p:embeddedFont>
     <p:embeddedFont>
       <p:font typeface="Franklin Gothic Medium Cond" panose="020B0606030402020204" pitchFamily="34" charset="0"/>
-      <p:regular r:id="rId32"/>
+      <p:regular r:id="rId33"/>
     </p:embeddedFont>
   </p:embeddedFontLst>
   <p:defaultTextStyle>
@@ -271,7 +272,7 @@
           <a:p>
             <a:fld id="{01926CF7-48D8-2F46-AFC8-8A5D2298DFDD}" type="datetimeFigureOut">
               <a:rPr lang="en-US" smtClean="0"/>
-              <a:t>8/30/23</a:t>
+              <a:t>9/4/23</a:t>
             </a:fld>
             <a:endParaRPr lang="en-US"/>
           </a:p>
@@ -958,6 +959,90 @@
 </p:notes>
 </file>
 
+<file path=ppt/notesSlides/notesSlide6.xml><?xml version="1.0" encoding="utf-8"?>
+<p:notes xmlns:a="http://schemas.openxmlformats.org/drawingml/2006/main" xmlns:r="http://schemas.openxmlformats.org/officeDocument/2006/relationships" xmlns:p="http://schemas.openxmlformats.org/presentationml/2006/main">
+  <p:cSld>
+    <p:spTree>
+      <p:nvGrpSpPr>
+        <p:cNvPr id="1" name=""/>
+        <p:cNvGrpSpPr/>
+        <p:nvPr/>
+      </p:nvGrpSpPr>
+      <p:grpSpPr>
+        <a:xfrm>
+          <a:off x="0" y="0"/>
+          <a:ext cx="0" cy="0"/>
+          <a:chOff x="0" y="0"/>
+          <a:chExt cx="0" cy="0"/>
+        </a:xfrm>
+      </p:grpSpPr>
+      <p:sp>
+        <p:nvSpPr>
+          <p:cNvPr id="2" name="Slide Image Placeholder 1"/>
+          <p:cNvSpPr>
+            <a:spLocks noGrp="1" noRot="1" noChangeAspect="1"/>
+          </p:cNvSpPr>
+          <p:nvPr>
+            <p:ph type="sldImg"/>
+          </p:nvPr>
+        </p:nvSpPr>
+        <p:spPr/>
+      </p:sp>
+      <p:sp>
+        <p:nvSpPr>
+          <p:cNvPr id="3" name="Notes Placeholder 2"/>
+          <p:cNvSpPr>
+            <a:spLocks noGrp="1"/>
+          </p:cNvSpPr>
+          <p:nvPr>
+            <p:ph type="body" idx="1"/>
+          </p:nvPr>
+        </p:nvSpPr>
+        <p:spPr/>
+        <p:txBody>
+          <a:bodyPr/>
+          <a:lstStyle/>
+          <a:p>
+            <a:endParaRPr lang="en-US" dirty="0"/>
+          </a:p>
+        </p:txBody>
+      </p:sp>
+      <p:sp>
+        <p:nvSpPr>
+          <p:cNvPr id="4" name="Slide Number Placeholder 3"/>
+          <p:cNvSpPr>
+            <a:spLocks noGrp="1"/>
+          </p:cNvSpPr>
+          <p:nvPr>
+            <p:ph type="sldNum" sz="quarter" idx="5"/>
+          </p:nvPr>
+        </p:nvSpPr>
+        <p:spPr/>
+        <p:txBody>
+          <a:bodyPr/>
+          <a:lstStyle/>
+          <a:p>
+            <a:fld id="{237BF745-0557-B241-863F-056113C7032A}" type="slidenum">
+              <a:rPr lang="en-US" smtClean="0"/>
+              <a:t>7</a:t>
+            </a:fld>
+            <a:endParaRPr lang="en-US"/>
+          </a:p>
+        </p:txBody>
+      </p:sp>
+    </p:spTree>
+    <p:extLst>
+      <p:ext uri="{BB962C8B-B14F-4D97-AF65-F5344CB8AC3E}">
+        <p14:creationId xmlns:p14="http://schemas.microsoft.com/office/powerpoint/2010/main" val="283498475"/>
+      </p:ext>
+    </p:extLst>
+  </p:cSld>
+  <p:clrMapOvr>
+    <a:masterClrMapping/>
+  </p:clrMapOvr>
+</p:notes>
+</file>
+
 <file path=ppt/slideLayouts/slideLayout1.xml><?xml version="1.0" encoding="utf-8"?>
 <p:sldLayout xmlns:a="http://schemas.openxmlformats.org/drawingml/2006/main" xmlns:r="http://schemas.openxmlformats.org/officeDocument/2006/relationships" xmlns:p="http://schemas.openxmlformats.org/presentationml/2006/main" preserve="1" userDrawn="1">
   <p:cSld name="Title Slide - Black">
@@ -13210,7 +13295,7 @@
             <a:fld id="{D47A9A36-4EB0-BF46-AE48-7CDA251B954B}" type="datetime1">
               <a:rPr lang="en-US" smtClean="0"/>
               <a:pPr/>
-              <a:t>8/30/23</a:t>
+              <a:t>9/4/23</a:t>
             </a:fld>
             <a:endParaRPr lang="en-US"/>
           </a:p>
@@ -16604,7 +16689,7 @@
             <a:fld id="{E0C8DACD-4E35-4E4C-AC75-C3DE50F04E7E}" type="datetime1">
               <a:rPr lang="en-US" smtClean="0"/>
               <a:pPr/>
-              <a:t>8/30/23</a:t>
+              <a:t>9/4/23</a:t>
             </a:fld>
             <a:endParaRPr lang="en-US"/>
           </a:p>
@@ -16953,7 +17038,7 @@
             <a:fld id="{E0C8DACD-4E35-4E4C-AC75-C3DE50F04E7E}" type="datetime1">
               <a:rPr lang="en-US" smtClean="0"/>
               <a:pPr/>
-              <a:t>8/30/23</a:t>
+              <a:t>9/4/23</a:t>
             </a:fld>
             <a:endParaRPr lang="en-US"/>
           </a:p>
@@ -17217,7 +17302,7 @@
                   <a:schemeClr val="bg1"/>
                 </a:solidFill>
               </a:rPr>
-              <a:t>What went less during Sprint #1? (Lego Activity, Mentor/Lab Meeting)</a:t>
+              <a:t>What didn’t go well during Sprint #1? (Lego Activity, Mentor/Lab Meeting)</a:t>
             </a:r>
           </a:p>
           <a:p>
@@ -17371,7 +17456,7 @@
                   <a:srgbClr val="EBD99F"/>
                 </a:solidFill>
               </a:rPr>
-              <a:t>Daily Stand-up (5-10 minutes)</a:t>
+              <a:t>Stand-up (5-10 minutes)</a:t>
             </a:r>
           </a:p>
         </p:txBody>
@@ -17534,7 +17619,7 @@
             <a:fld id="{E0C8DACD-4E35-4E4C-AC75-C3DE50F04E7E}" type="datetime1">
               <a:rPr lang="en-US" smtClean="0"/>
               <a:pPr/>
-              <a:t>8/30/23</a:t>
+              <a:t>9/4/23</a:t>
             </a:fld>
             <a:endParaRPr lang="en-US"/>
           </a:p>
@@ -18097,7 +18182,7 @@
             <a:fld id="{E0C8DACD-4E35-4E4C-AC75-C3DE50F04E7E}" type="datetime1">
               <a:rPr lang="en-US" smtClean="0"/>
               <a:pPr/>
-              <a:t>8/30/23</a:t>
+              <a:t>9/4/23</a:t>
             </a:fld>
             <a:endParaRPr lang="en-US"/>
           </a:p>
@@ -18667,7 +18752,7 @@
             <a:fld id="{E0C8DACD-4E35-4E4C-AC75-C3DE50F04E7E}" type="datetime1">
               <a:rPr lang="en-US" smtClean="0"/>
               <a:pPr/>
-              <a:t>8/30/23</a:t>
+              <a:t>9/4/23</a:t>
             </a:fld>
             <a:endParaRPr lang="en-US"/>
           </a:p>
@@ -18781,6 +18866,402 @@
     <p:extLst>
       <p:ext uri="{BB962C8B-B14F-4D97-AF65-F5344CB8AC3E}">
         <p14:creationId xmlns:p14="http://schemas.microsoft.com/office/powerpoint/2010/main" val="2109556261"/>
+      </p:ext>
+    </p:extLst>
+  </p:cSld>
+  <p:clrMapOvr>
+    <a:masterClrMapping/>
+  </p:clrMapOvr>
+</p:sld>
+</file>
+
+<file path=ppt/slides/slide7.xml><?xml version="1.0" encoding="utf-8"?>
+<p:sld xmlns:a="http://schemas.openxmlformats.org/drawingml/2006/main" xmlns:r="http://schemas.openxmlformats.org/officeDocument/2006/relationships" xmlns:p="http://schemas.openxmlformats.org/presentationml/2006/main">
+  <p:cSld>
+    <p:spTree>
+      <p:nvGrpSpPr>
+        <p:cNvPr id="1" name=""/>
+        <p:cNvGrpSpPr/>
+        <p:nvPr/>
+      </p:nvGrpSpPr>
+      <p:grpSpPr>
+        <a:xfrm>
+          <a:off x="0" y="0"/>
+          <a:ext cx="0" cy="0"/>
+          <a:chOff x="0" y="0"/>
+          <a:chExt cx="0" cy="0"/>
+        </a:xfrm>
+      </p:grpSpPr>
+      <p:sp>
+        <p:nvSpPr>
+          <p:cNvPr id="6" name="Title 5">
+            <a:extLst>
+              <a:ext uri="{FF2B5EF4-FFF2-40B4-BE49-F238E27FC236}">
+                <a16:creationId xmlns:a16="http://schemas.microsoft.com/office/drawing/2014/main" id="{D08AB06A-6B63-9A84-6282-A333F77AFEA1}"/>
+              </a:ext>
+            </a:extLst>
+          </p:cNvPr>
+          <p:cNvSpPr>
+            <a:spLocks noGrp="1"/>
+          </p:cNvSpPr>
+          <p:nvPr>
+            <p:ph type="ctrTitle"/>
+          </p:nvPr>
+        </p:nvSpPr>
+        <p:spPr>
+          <a:xfrm>
+            <a:off x="2101510" y="370921"/>
+            <a:ext cx="7988980" cy="626325"/>
+          </a:xfrm>
+        </p:spPr>
+        <p:txBody>
+          <a:bodyPr/>
+          <a:lstStyle/>
+          <a:p>
+            <a:r>
+              <a:rPr lang="en-US" sz="4400" dirty="0">
+                <a:solidFill>
+                  <a:srgbClr val="EBD99F"/>
+                </a:solidFill>
+              </a:rPr>
+              <a:t>Starter Guide &amp; Literature Review</a:t>
+            </a:r>
+          </a:p>
+        </p:txBody>
+      </p:sp>
+      <p:sp>
+        <p:nvSpPr>
+          <p:cNvPr id="5" name="Slide Number Placeholder 4">
+            <a:extLst>
+              <a:ext uri="{FF2B5EF4-FFF2-40B4-BE49-F238E27FC236}">
+                <a16:creationId xmlns:a16="http://schemas.microsoft.com/office/drawing/2014/main" id="{079CDBEF-9D1D-DDB1-C4C8-A9817DA62F9A}"/>
+              </a:ext>
+            </a:extLst>
+          </p:cNvPr>
+          <p:cNvSpPr>
+            <a:spLocks noGrp="1"/>
+          </p:cNvSpPr>
+          <p:nvPr>
+            <p:ph type="sldNum" sz="quarter" idx="12"/>
+          </p:nvPr>
+        </p:nvSpPr>
+        <p:spPr/>
+        <p:txBody>
+          <a:bodyPr/>
+          <a:lstStyle/>
+          <a:p>
+            <a:fld id="{8A7A6979-0714-4377-B894-6BE4C2D6E202}" type="slidenum">
+              <a:rPr lang="en-US" smtClean="0"/>
+              <a:pPr/>
+              <a:t>7</a:t>
+            </a:fld>
+            <a:endParaRPr lang="en-US"/>
+          </a:p>
+        </p:txBody>
+      </p:sp>
+      <p:sp>
+        <p:nvSpPr>
+          <p:cNvPr id="4" name="Date Placeholder 3">
+            <a:extLst>
+              <a:ext uri="{FF2B5EF4-FFF2-40B4-BE49-F238E27FC236}">
+                <a16:creationId xmlns:a16="http://schemas.microsoft.com/office/drawing/2014/main" id="{4CDE6F09-9B10-5238-7123-0B118E57F72B}"/>
+              </a:ext>
+            </a:extLst>
+          </p:cNvPr>
+          <p:cNvSpPr>
+            <a:spLocks noGrp="1"/>
+          </p:cNvSpPr>
+          <p:nvPr>
+            <p:ph type="dt" sz="half" idx="4294967295"/>
+          </p:nvPr>
+        </p:nvSpPr>
+        <p:spPr>
+          <a:xfrm>
+            <a:off x="8744769" y="6227670"/>
+            <a:ext cx="1161231" cy="323968"/>
+          </a:xfrm>
+          <a:prstGeom prst="rect">
+            <a:avLst/>
+          </a:prstGeom>
+        </p:spPr>
+        <p:txBody>
+          <a:bodyPr vert="horz" lIns="91440" tIns="45720" rIns="91440" bIns="45720" rtlCol="0" anchor="ctr"/>
+          <a:lstStyle>
+            <a:defPPr>
+              <a:defRPr lang="en-US"/>
+            </a:defPPr>
+            <a:lvl1pPr marL="0" algn="r" defTabSz="457200" rtl="0" eaLnBrk="1" latinLnBrk="0" hangingPunct="1">
+              <a:defRPr sz="1000" b="0" i="0" kern="1200">
+                <a:solidFill>
+                  <a:schemeClr val="tx1">
+                    <a:alpha val="70000"/>
+                  </a:schemeClr>
+                </a:solidFill>
+                <a:latin typeface="Acumin Pro" panose="020B0504020202020204" pitchFamily="34" charset="77"/>
+                <a:ea typeface="+mn-ea"/>
+                <a:cs typeface="+mn-cs"/>
+              </a:defRPr>
+            </a:lvl1pPr>
+            <a:lvl2pPr marL="457200" algn="l" defTabSz="457200" rtl="0" eaLnBrk="1" latinLnBrk="0" hangingPunct="1">
+              <a:defRPr sz="1800" kern="1200">
+                <a:solidFill>
+                  <a:schemeClr val="tx1"/>
+                </a:solidFill>
+                <a:latin typeface="+mn-lt"/>
+                <a:ea typeface="+mn-ea"/>
+                <a:cs typeface="+mn-cs"/>
+              </a:defRPr>
+            </a:lvl2pPr>
+            <a:lvl3pPr marL="914400" algn="l" defTabSz="457200" rtl="0" eaLnBrk="1" latinLnBrk="0" hangingPunct="1">
+              <a:defRPr sz="1800" kern="1200">
+                <a:solidFill>
+                  <a:schemeClr val="tx1"/>
+                </a:solidFill>
+                <a:latin typeface="+mn-lt"/>
+                <a:ea typeface="+mn-ea"/>
+                <a:cs typeface="+mn-cs"/>
+              </a:defRPr>
+            </a:lvl3pPr>
+            <a:lvl4pPr marL="1371600" algn="l" defTabSz="457200" rtl="0" eaLnBrk="1" latinLnBrk="0" hangingPunct="1">
+              <a:defRPr sz="1800" kern="1200">
+                <a:solidFill>
+                  <a:schemeClr val="tx1"/>
+                </a:solidFill>
+                <a:latin typeface="+mn-lt"/>
+                <a:ea typeface="+mn-ea"/>
+                <a:cs typeface="+mn-cs"/>
+              </a:defRPr>
+            </a:lvl4pPr>
+            <a:lvl5pPr marL="1828800" algn="l" defTabSz="457200" rtl="0" eaLnBrk="1" latinLnBrk="0" hangingPunct="1">
+              <a:defRPr sz="1800" kern="1200">
+                <a:solidFill>
+                  <a:schemeClr val="tx1"/>
+                </a:solidFill>
+                <a:latin typeface="+mn-lt"/>
+                <a:ea typeface="+mn-ea"/>
+                <a:cs typeface="+mn-cs"/>
+              </a:defRPr>
+            </a:lvl5pPr>
+            <a:lvl6pPr marL="2286000" algn="l" defTabSz="457200" rtl="0" eaLnBrk="1" latinLnBrk="0" hangingPunct="1">
+              <a:defRPr sz="1800" kern="1200">
+                <a:solidFill>
+                  <a:schemeClr val="tx1"/>
+                </a:solidFill>
+                <a:latin typeface="+mn-lt"/>
+                <a:ea typeface="+mn-ea"/>
+                <a:cs typeface="+mn-cs"/>
+              </a:defRPr>
+            </a:lvl6pPr>
+            <a:lvl7pPr marL="2743200" algn="l" defTabSz="457200" rtl="0" eaLnBrk="1" latinLnBrk="0" hangingPunct="1">
+              <a:defRPr sz="1800" kern="1200">
+                <a:solidFill>
+                  <a:schemeClr val="tx1"/>
+                </a:solidFill>
+                <a:latin typeface="+mn-lt"/>
+                <a:ea typeface="+mn-ea"/>
+                <a:cs typeface="+mn-cs"/>
+              </a:defRPr>
+            </a:lvl7pPr>
+            <a:lvl8pPr marL="3200400" algn="l" defTabSz="457200" rtl="0" eaLnBrk="1" latinLnBrk="0" hangingPunct="1">
+              <a:defRPr sz="1800" kern="1200">
+                <a:solidFill>
+                  <a:schemeClr val="tx1"/>
+                </a:solidFill>
+                <a:latin typeface="+mn-lt"/>
+                <a:ea typeface="+mn-ea"/>
+                <a:cs typeface="+mn-cs"/>
+              </a:defRPr>
+            </a:lvl8pPr>
+            <a:lvl9pPr marL="3657600" algn="l" defTabSz="457200" rtl="0" eaLnBrk="1" latinLnBrk="0" hangingPunct="1">
+              <a:defRPr sz="1800" kern="1200">
+                <a:solidFill>
+                  <a:schemeClr val="tx1"/>
+                </a:solidFill>
+                <a:latin typeface="+mn-lt"/>
+                <a:ea typeface="+mn-ea"/>
+                <a:cs typeface="+mn-cs"/>
+              </a:defRPr>
+            </a:lvl9pPr>
+          </a:lstStyle>
+          <a:p>
+            <a:fld id="{E0C8DACD-4E35-4E4C-AC75-C3DE50F04E7E}" type="datetime1">
+              <a:rPr lang="en-US" smtClean="0"/>
+              <a:pPr/>
+              <a:t>9/4/23</a:t>
+            </a:fld>
+            <a:endParaRPr lang="en-US"/>
+          </a:p>
+        </p:txBody>
+      </p:sp>
+      <p:sp>
+        <p:nvSpPr>
+          <p:cNvPr id="9" name="TextBox 8">
+            <a:extLst>
+              <a:ext uri="{FF2B5EF4-FFF2-40B4-BE49-F238E27FC236}">
+                <a16:creationId xmlns:a16="http://schemas.microsoft.com/office/drawing/2014/main" id="{F8678FA1-F450-79FC-F095-B4F244524A43}"/>
+              </a:ext>
+            </a:extLst>
+          </p:cNvPr>
+          <p:cNvSpPr txBox="1"/>
+          <p:nvPr/>
+        </p:nvSpPr>
+        <p:spPr>
+          <a:xfrm>
+            <a:off x="1366772" y="5580669"/>
+            <a:ext cx="10466172" cy="646331"/>
+          </a:xfrm>
+          <a:prstGeom prst="rect">
+            <a:avLst/>
+          </a:prstGeom>
+          <a:noFill/>
+        </p:spPr>
+        <p:txBody>
+          <a:bodyPr wrap="square">
+            <a:spAutoFit/>
+          </a:bodyPr>
+          <a:lstStyle/>
+          <a:p>
+            <a:r>
+              <a:rPr lang="en-US" b="1" u="sng" dirty="0">
+                <a:solidFill>
+                  <a:schemeClr val="bg1"/>
+                </a:solidFill>
+                <a:hlinkClick r:id="rId3"/>
+              </a:rPr>
+              <a:t>Starter guides: </a:t>
+            </a:r>
+            <a:r>
+              <a:rPr lang="en-US" b="1" u="sng" dirty="0">
+                <a:solidFill>
+                  <a:schemeClr val="bg1"/>
+                </a:solidFill>
+              </a:rPr>
+              <a:t> </a:t>
+            </a:r>
+            <a:r>
+              <a:rPr lang="en-US" b="1" u="sng" dirty="0">
+                <a:solidFill>
+                  <a:schemeClr val="bg1"/>
+                </a:solidFill>
+                <a:hlinkClick r:id="rId4"/>
+              </a:rPr>
+              <a:t>https://the-examples-book.com/starter-guides/introduction</a:t>
+            </a:r>
+            <a:endParaRPr lang="en-US" b="1" u="sng" dirty="0">
+              <a:solidFill>
+                <a:schemeClr val="bg1"/>
+              </a:solidFill>
+            </a:endParaRPr>
+          </a:p>
+          <a:p>
+            <a:r>
+              <a:rPr lang="en-US" b="1" u="sng" dirty="0">
+                <a:solidFill>
+                  <a:schemeClr val="bg1"/>
+                </a:solidFill>
+              </a:rPr>
+              <a:t>Purdue literature review guide: https://</a:t>
+            </a:r>
+            <a:r>
+              <a:rPr lang="en-US" b="1" u="sng" dirty="0" err="1">
+                <a:solidFill>
+                  <a:schemeClr val="bg1"/>
+                </a:solidFill>
+              </a:rPr>
+              <a:t>guides.lib.purdue.edu</a:t>
+            </a:r>
+            <a:r>
+              <a:rPr lang="en-US" b="1" u="sng" dirty="0">
+                <a:solidFill>
+                  <a:schemeClr val="bg1"/>
+                </a:solidFill>
+              </a:rPr>
+              <a:t>/</a:t>
+            </a:r>
+            <a:r>
+              <a:rPr lang="en-US" b="1" u="sng" dirty="0" err="1">
+                <a:solidFill>
+                  <a:schemeClr val="bg1"/>
+                </a:solidFill>
+              </a:rPr>
+              <a:t>research_approaches</a:t>
+            </a:r>
+            <a:r>
+              <a:rPr lang="en-US" b="1" u="sng" dirty="0">
+                <a:solidFill>
+                  <a:schemeClr val="bg1"/>
+                </a:solidFill>
+              </a:rPr>
+              <a:t>/</a:t>
+            </a:r>
+            <a:r>
+              <a:rPr lang="en-US" b="1" u="sng" dirty="0" err="1">
+                <a:solidFill>
+                  <a:schemeClr val="bg1"/>
+                </a:solidFill>
+              </a:rPr>
+              <a:t>litreview</a:t>
+            </a:r>
+            <a:endParaRPr lang="en-US" b="1" u="sng" dirty="0">
+              <a:solidFill>
+                <a:schemeClr val="bg1"/>
+              </a:solidFill>
+            </a:endParaRPr>
+          </a:p>
+        </p:txBody>
+      </p:sp>
+      <p:pic>
+        <p:nvPicPr>
+          <p:cNvPr id="1026" name="Picture 2" descr="12,600+ Literature Review Stock Photos, Pictures &amp; Royalty-Free Images -  iStock | Literature review icon">
+            <a:hlinkClick r:id="rId5"/>
+            <a:extLst>
+              <a:ext uri="{FF2B5EF4-FFF2-40B4-BE49-F238E27FC236}">
+                <a16:creationId xmlns:a16="http://schemas.microsoft.com/office/drawing/2014/main" id="{E31AAAD4-16CD-F88D-7145-0968C1730AEB}"/>
+              </a:ext>
+            </a:extLst>
+          </p:cNvPr>
+          <p:cNvPicPr>
+            <a:picLocks noChangeAspect="1" noChangeArrowheads="1"/>
+          </p:cNvPicPr>
+          <p:nvPr/>
+        </p:nvPicPr>
+        <p:blipFill>
+          <a:blip r:embed="rId6">
+            <a:extLst>
+              <a:ext uri="{28A0092B-C50C-407E-A947-70E740481C1C}">
+                <a14:useLocalDpi xmlns:a14="http://schemas.microsoft.com/office/drawing/2010/main" val="0"/>
+              </a:ext>
+            </a:extLst>
+          </a:blip>
+          <a:srcRect/>
+          <a:stretch>
+            <a:fillRect/>
+          </a:stretch>
+        </p:blipFill>
+        <p:spPr bwMode="auto">
+          <a:xfrm>
+            <a:off x="3528189" y="1311754"/>
+            <a:ext cx="5888313" cy="3954406"/>
+          </a:xfrm>
+          <a:prstGeom prst="rect">
+            <a:avLst/>
+          </a:prstGeom>
+          <a:noFill/>
+          <a:extLst>
+            <a:ext uri="{909E8E84-426E-40DD-AFC4-6F175D3DCCD1}">
+              <a14:hiddenFill xmlns:a14="http://schemas.microsoft.com/office/drawing/2010/main">
+                <a:solidFill>
+                  <a:srgbClr val="FFFFFF"/>
+                </a:solidFill>
+              </a14:hiddenFill>
+            </a:ext>
+          </a:extLst>
+        </p:spPr>
+      </p:pic>
+    </p:spTree>
+    <p:extLst>
+      <p:ext uri="{BB962C8B-B14F-4D97-AF65-F5344CB8AC3E}">
+        <p14:creationId xmlns:p14="http://schemas.microsoft.com/office/powerpoint/2010/main" val="4040738487"/>
       </p:ext>
     </p:extLst>
   </p:cSld>

</xml_diff>